<commit_message>
Updated diagram after review
</commit_message>
<xml_diff>
--- a/concept_eval/diagrams/systems_diagram.pptx
+++ b/concept_eval/diagrams/systems_diagram.pptx
@@ -106,7 +106,7 @@
   </p:defaultTextStyle>
   <p:extLst>
     <p:ext uri="{EFAFB233-063F-42B5-8137-9DF3F51BA10A}">
-      <p15:sldGuideLst xmlns:p15="http://schemas.microsoft.com/office/powerpoint/2012/main">
+      <p15:sldGuideLst xmlns:p15="http://schemas.microsoft.com/office/powerpoint/2012/main" xmlns="">
         <p15:guide id="1" orient="horz" pos="2160">
           <p15:clr>
             <a:srgbClr val="A4A3A4"/>
@@ -304,7 +304,7 @@
           <a:p>
             <a:fld id="{E66B24CA-399B-4047-8224-01590B4E0706}" type="datetimeFigureOut">
               <a:rPr lang="en-US" smtClean="0"/>
-              <a:t>10/24/2016</a:t>
+              <a:t>10/25/16</a:t>
             </a:fld>
             <a:endParaRPr lang="en-US"/>
           </a:p>
@@ -474,7 +474,7 @@
           <a:p>
             <a:fld id="{E66B24CA-399B-4047-8224-01590B4E0706}" type="datetimeFigureOut">
               <a:rPr lang="en-US" smtClean="0"/>
-              <a:t>10/24/2016</a:t>
+              <a:t>10/25/16</a:t>
             </a:fld>
             <a:endParaRPr lang="en-US"/>
           </a:p>
@@ -654,7 +654,7 @@
           <a:p>
             <a:fld id="{E66B24CA-399B-4047-8224-01590B4E0706}" type="datetimeFigureOut">
               <a:rPr lang="en-US" smtClean="0"/>
-              <a:t>10/24/2016</a:t>
+              <a:t>10/25/16</a:t>
             </a:fld>
             <a:endParaRPr lang="en-US"/>
           </a:p>
@@ -824,7 +824,7 @@
           <a:p>
             <a:fld id="{E66B24CA-399B-4047-8224-01590B4E0706}" type="datetimeFigureOut">
               <a:rPr lang="en-US" smtClean="0"/>
-              <a:t>10/24/2016</a:t>
+              <a:t>10/25/16</a:t>
             </a:fld>
             <a:endParaRPr lang="en-US"/>
           </a:p>
@@ -1070,7 +1070,7 @@
           <a:p>
             <a:fld id="{E66B24CA-399B-4047-8224-01590B4E0706}" type="datetimeFigureOut">
               <a:rPr lang="en-US" smtClean="0"/>
-              <a:t>10/24/2016</a:t>
+              <a:t>10/25/16</a:t>
             </a:fld>
             <a:endParaRPr lang="en-US"/>
           </a:p>
@@ -1358,7 +1358,7 @@
           <a:p>
             <a:fld id="{E66B24CA-399B-4047-8224-01590B4E0706}" type="datetimeFigureOut">
               <a:rPr lang="en-US" smtClean="0"/>
-              <a:t>10/24/2016</a:t>
+              <a:t>10/25/16</a:t>
             </a:fld>
             <a:endParaRPr lang="en-US"/>
           </a:p>
@@ -1780,7 +1780,7 @@
           <a:p>
             <a:fld id="{E66B24CA-399B-4047-8224-01590B4E0706}" type="datetimeFigureOut">
               <a:rPr lang="en-US" smtClean="0"/>
-              <a:t>10/24/2016</a:t>
+              <a:t>10/25/16</a:t>
             </a:fld>
             <a:endParaRPr lang="en-US"/>
           </a:p>
@@ -1898,7 +1898,7 @@
           <a:p>
             <a:fld id="{E66B24CA-399B-4047-8224-01590B4E0706}" type="datetimeFigureOut">
               <a:rPr lang="en-US" smtClean="0"/>
-              <a:t>10/24/2016</a:t>
+              <a:t>10/25/16</a:t>
             </a:fld>
             <a:endParaRPr lang="en-US"/>
           </a:p>
@@ -1993,7 +1993,7 @@
           <a:p>
             <a:fld id="{E66B24CA-399B-4047-8224-01590B4E0706}" type="datetimeFigureOut">
               <a:rPr lang="en-US" smtClean="0"/>
-              <a:t>10/24/2016</a:t>
+              <a:t>10/25/16</a:t>
             </a:fld>
             <a:endParaRPr lang="en-US"/>
           </a:p>
@@ -2270,7 +2270,7 @@
           <a:p>
             <a:fld id="{E66B24CA-399B-4047-8224-01590B4E0706}" type="datetimeFigureOut">
               <a:rPr lang="en-US" smtClean="0"/>
-              <a:t>10/24/2016</a:t>
+              <a:t>10/25/16</a:t>
             </a:fld>
             <a:endParaRPr lang="en-US"/>
           </a:p>
@@ -2523,7 +2523,7 @@
           <a:p>
             <a:fld id="{E66B24CA-399B-4047-8224-01590B4E0706}" type="datetimeFigureOut">
               <a:rPr lang="en-US" smtClean="0"/>
-              <a:t>10/24/2016</a:t>
+              <a:t>10/25/16</a:t>
             </a:fld>
             <a:endParaRPr lang="en-US"/>
           </a:p>
@@ -2736,7 +2736,7 @@
           <a:p>
             <a:fld id="{E66B24CA-399B-4047-8224-01590B4E0706}" type="datetimeFigureOut">
               <a:rPr lang="en-US" smtClean="0"/>
-              <a:t>10/24/2016</a:t>
+              <a:t>10/25/16</a:t>
             </a:fld>
             <a:endParaRPr lang="en-US"/>
           </a:p>
@@ -3603,7 +3603,7 @@
                   <a:srgbClr val="000000"/>
                 </a:solidFill>
               </a:rPr>
-              <a:t>Drive Controller</a:t>
+              <a:t>Locomotion</a:t>
             </a:r>
             <a:endParaRPr lang="en-US" sz="1200" dirty="0">
               <a:solidFill>
@@ -3672,105 +3672,13 @@
       </p:sp>
       <p:sp>
         <p:nvSpPr>
-          <p:cNvPr id="25" name="Rectangle 24"/>
-          <p:cNvSpPr/>
-          <p:nvPr/>
-        </p:nvSpPr>
-        <p:spPr>
-          <a:xfrm>
-            <a:off x="6842287" y="4575674"/>
-            <a:ext cx="1333500" cy="665480"/>
-          </a:xfrm>
-          <a:prstGeom prst="rect">
-            <a:avLst/>
-          </a:prstGeom>
-          <a:noFill/>
-          <a:ln>
-            <a:solidFill>
-              <a:schemeClr val="tx1"/>
-            </a:solidFill>
-          </a:ln>
-          <a:effectLst/>
-        </p:spPr>
-        <p:style>
-          <a:lnRef idx="1">
-            <a:schemeClr val="accent1"/>
-          </a:lnRef>
-          <a:fillRef idx="3">
-            <a:schemeClr val="accent1"/>
-          </a:fillRef>
-          <a:effectRef idx="2">
-            <a:schemeClr val="accent1"/>
-          </a:effectRef>
-          <a:fontRef idx="minor">
-            <a:schemeClr val="lt1"/>
-          </a:fontRef>
-        </p:style>
-        <p:txBody>
-          <a:bodyPr anchor="ctr" anchorCtr="0"/>
-          <a:lstStyle/>
-          <a:p>
-            <a:pPr algn="ctr"/>
-            <a:r>
-              <a:rPr lang="en-US" sz="1200" dirty="0" smtClean="0">
-                <a:solidFill>
-                  <a:srgbClr val="000000"/>
-                </a:solidFill>
-              </a:rPr>
-              <a:t>Writing Tool Mechanism</a:t>
-            </a:r>
-          </a:p>
-        </p:txBody>
-      </p:sp>
-      <p:cxnSp>
-        <p:nvCxnSpPr>
-          <p:cNvPr id="26" name="Straight Arrow Connector 25"/>
-          <p:cNvCxnSpPr>
-            <a:stCxn id="18" idx="2"/>
-            <a:endCxn id="25" idx="0"/>
-          </p:cNvCxnSpPr>
-          <p:nvPr/>
-        </p:nvCxnSpPr>
-        <p:spPr>
-          <a:xfrm flipH="1">
-            <a:off x="7509037" y="4069952"/>
-            <a:ext cx="2" cy="505722"/>
-          </a:xfrm>
-          <a:prstGeom prst="straightConnector1">
-            <a:avLst/>
-          </a:prstGeom>
-          <a:ln>
-            <a:solidFill>
-              <a:schemeClr val="tx1"/>
-            </a:solidFill>
-            <a:tailEnd type="arrow"/>
-          </a:ln>
-          <a:effectLst/>
-        </p:spPr>
-        <p:style>
-          <a:lnRef idx="2">
-            <a:schemeClr val="accent1"/>
-          </a:lnRef>
-          <a:fillRef idx="0">
-            <a:schemeClr val="accent1"/>
-          </a:fillRef>
-          <a:effectRef idx="1">
-            <a:schemeClr val="accent1"/>
-          </a:effectRef>
-          <a:fontRef idx="minor">
-            <a:schemeClr val="tx1"/>
-          </a:fontRef>
-        </p:style>
-      </p:cxnSp>
-      <p:sp>
-        <p:nvSpPr>
           <p:cNvPr id="36" name="Rectangle 35"/>
           <p:cNvSpPr/>
           <p:nvPr/>
         </p:nvSpPr>
         <p:spPr>
           <a:xfrm>
-            <a:off x="4715100" y="5463642"/>
+            <a:off x="4715102" y="4575675"/>
             <a:ext cx="1333500" cy="665480"/>
           </a:xfrm>
           <a:prstGeom prst="rect">
@@ -3862,14 +3770,14 @@
       </p:cxnSp>
       <p:sp>
         <p:nvSpPr>
-          <p:cNvPr id="61" name="Rectangle 60"/>
+          <p:cNvPr id="103" name="Rectangle 102"/>
           <p:cNvSpPr/>
           <p:nvPr/>
         </p:nvSpPr>
         <p:spPr>
           <a:xfrm>
-            <a:off x="4715101" y="4533514"/>
-            <a:ext cx="1333500" cy="665480"/>
+            <a:off x="2609494" y="4645743"/>
+            <a:ext cx="1094508" cy="525341"/>
           </a:xfrm>
           <a:prstGeom prst="rect">
             <a:avLst/>
@@ -3907,98 +3815,6 @@
                   <a:srgbClr val="000000"/>
                 </a:solidFill>
               </a:rPr>
-              <a:t>Drive Safety</a:t>
-            </a:r>
-          </a:p>
-        </p:txBody>
-      </p:sp>
-      <p:cxnSp>
-        <p:nvCxnSpPr>
-          <p:cNvPr id="62" name="Straight Arrow Connector 61"/>
-          <p:cNvCxnSpPr>
-            <a:stCxn id="61" idx="0"/>
-            <a:endCxn id="17" idx="2"/>
-          </p:cNvCxnSpPr>
-          <p:nvPr/>
-        </p:nvCxnSpPr>
-        <p:spPr>
-          <a:xfrm flipV="1">
-            <a:off x="5381851" y="4044175"/>
-            <a:ext cx="0" cy="489339"/>
-          </a:xfrm>
-          <a:prstGeom prst="straightConnector1">
-            <a:avLst/>
-          </a:prstGeom>
-          <a:ln>
-            <a:solidFill>
-              <a:schemeClr val="tx1"/>
-            </a:solidFill>
-            <a:tailEnd type="arrow"/>
-          </a:ln>
-          <a:effectLst/>
-        </p:spPr>
-        <p:style>
-          <a:lnRef idx="2">
-            <a:schemeClr val="accent1"/>
-          </a:lnRef>
-          <a:fillRef idx="0">
-            <a:schemeClr val="accent1"/>
-          </a:fillRef>
-          <a:effectRef idx="1">
-            <a:schemeClr val="accent1"/>
-          </a:effectRef>
-          <a:fontRef idx="minor">
-            <a:schemeClr val="tx1"/>
-          </a:fontRef>
-        </p:style>
-      </p:cxnSp>
-      <p:sp>
-        <p:nvSpPr>
-          <p:cNvPr id="103" name="Rectangle 102"/>
-          <p:cNvSpPr/>
-          <p:nvPr/>
-        </p:nvSpPr>
-        <p:spPr>
-          <a:xfrm>
-            <a:off x="2609494" y="4645743"/>
-            <a:ext cx="1094508" cy="525341"/>
-          </a:xfrm>
-          <a:prstGeom prst="rect">
-            <a:avLst/>
-          </a:prstGeom>
-          <a:noFill/>
-          <a:ln>
-            <a:solidFill>
-              <a:schemeClr val="tx1"/>
-            </a:solidFill>
-          </a:ln>
-          <a:effectLst/>
-        </p:spPr>
-        <p:style>
-          <a:lnRef idx="1">
-            <a:schemeClr val="accent1"/>
-          </a:lnRef>
-          <a:fillRef idx="3">
-            <a:schemeClr val="accent1"/>
-          </a:fillRef>
-          <a:effectRef idx="2">
-            <a:schemeClr val="accent1"/>
-          </a:effectRef>
-          <a:fontRef idx="minor">
-            <a:schemeClr val="lt1"/>
-          </a:fontRef>
-        </p:style>
-        <p:txBody>
-          <a:bodyPr anchor="ctr" anchorCtr="0"/>
-          <a:lstStyle/>
-          <a:p>
-            <a:pPr algn="ctr"/>
-            <a:r>
-              <a:rPr lang="en-US" sz="1200" dirty="0" smtClean="0">
-                <a:solidFill>
-                  <a:srgbClr val="000000"/>
-                </a:solidFill>
-              </a:rPr>
               <a:t>Sensor Module</a:t>
             </a:r>
             <a:endParaRPr lang="en-US" sz="1200" dirty="0">
@@ -4009,47 +3825,6 @@
           </a:p>
         </p:txBody>
       </p:sp>
-      <p:cxnSp>
-        <p:nvCxnSpPr>
-          <p:cNvPr id="104" name="Elbow Connector 103"/>
-          <p:cNvCxnSpPr>
-            <a:stCxn id="36" idx="1"/>
-            <a:endCxn id="17" idx="1"/>
-          </p:cNvCxnSpPr>
-          <p:nvPr/>
-        </p:nvCxnSpPr>
-        <p:spPr>
-          <a:xfrm rot="10800000" flipH="1">
-            <a:off x="4715099" y="3711436"/>
-            <a:ext cx="1" cy="2084947"/>
-          </a:xfrm>
-          <a:prstGeom prst="bentConnector3">
-            <a:avLst>
-              <a:gd name="adj1" fmla="val -22860000000"/>
-            </a:avLst>
-          </a:prstGeom>
-          <a:ln w="25400">
-            <a:solidFill>
-              <a:schemeClr val="tx1"/>
-            </a:solidFill>
-            <a:tailEnd type="arrow"/>
-          </a:ln>
-        </p:spPr>
-        <p:style>
-          <a:lnRef idx="1">
-            <a:schemeClr val="accent1"/>
-          </a:lnRef>
-          <a:fillRef idx="0">
-            <a:schemeClr val="accent1"/>
-          </a:fillRef>
-          <a:effectRef idx="0">
-            <a:schemeClr val="accent1"/>
-          </a:effectRef>
-          <a:fontRef idx="minor">
-            <a:schemeClr val="tx1"/>
-          </a:fontRef>
-        </p:style>
-      </p:cxnSp>
       <p:cxnSp>
         <p:nvCxnSpPr>
           <p:cNvPr id="137" name="Straight Arrow Connector 136"/>
@@ -4063,103 +3838,6 @@
           <a:xfrm flipV="1">
             <a:off x="3156748" y="4004255"/>
             <a:ext cx="0" cy="641488"/>
-          </a:xfrm>
-          <a:prstGeom prst="straightConnector1">
-            <a:avLst/>
-          </a:prstGeom>
-          <a:ln>
-            <a:solidFill>
-              <a:schemeClr val="tx1"/>
-            </a:solidFill>
-            <a:tailEnd type="arrow"/>
-          </a:ln>
-          <a:effectLst/>
-        </p:spPr>
-        <p:style>
-          <a:lnRef idx="2">
-            <a:schemeClr val="accent1"/>
-          </a:lnRef>
-          <a:fillRef idx="0">
-            <a:schemeClr val="accent1"/>
-          </a:fillRef>
-          <a:effectRef idx="1">
-            <a:schemeClr val="accent1"/>
-          </a:effectRef>
-          <a:fontRef idx="minor">
-            <a:schemeClr val="tx1"/>
-          </a:fontRef>
-        </p:style>
-      </p:cxnSp>
-      <p:sp>
-        <p:nvSpPr>
-          <p:cNvPr id="140" name="Rectangle 139"/>
-          <p:cNvSpPr/>
-          <p:nvPr/>
-        </p:nvSpPr>
-        <p:spPr>
-          <a:xfrm>
-            <a:off x="2609494" y="2293323"/>
-            <a:ext cx="1094508" cy="525341"/>
-          </a:xfrm>
-          <a:prstGeom prst="rect">
-            <a:avLst/>
-          </a:prstGeom>
-          <a:noFill/>
-          <a:ln>
-            <a:solidFill>
-              <a:schemeClr val="tx1"/>
-            </a:solidFill>
-          </a:ln>
-          <a:effectLst/>
-        </p:spPr>
-        <p:style>
-          <a:lnRef idx="1">
-            <a:schemeClr val="accent1"/>
-          </a:lnRef>
-          <a:fillRef idx="3">
-            <a:schemeClr val="accent1"/>
-          </a:fillRef>
-          <a:effectRef idx="2">
-            <a:schemeClr val="accent1"/>
-          </a:effectRef>
-          <a:fontRef idx="minor">
-            <a:schemeClr val="lt1"/>
-          </a:fontRef>
-        </p:style>
-        <p:txBody>
-          <a:bodyPr anchor="ctr" anchorCtr="0"/>
-          <a:lstStyle/>
-          <a:p>
-            <a:pPr algn="ctr"/>
-            <a:r>
-              <a:rPr lang="en-US" sz="1200" dirty="0" smtClean="0">
-                <a:solidFill>
-                  <a:srgbClr val="000000"/>
-                </a:solidFill>
-              </a:rPr>
-              <a:t>Localization Safety</a:t>
-            </a:r>
-            <a:endParaRPr lang="en-US" sz="1200" dirty="0">
-              <a:solidFill>
-                <a:srgbClr val="000000"/>
-              </a:solidFill>
-            </a:endParaRPr>
-          </a:p>
-        </p:txBody>
-      </p:sp>
-      <p:cxnSp>
-        <p:nvCxnSpPr>
-          <p:cNvPr id="141" name="Straight Arrow Connector 140"/>
-          <p:cNvCxnSpPr>
-            <a:stCxn id="140" idx="2"/>
-            <a:endCxn id="15" idx="0"/>
-          </p:cNvCxnSpPr>
-          <p:nvPr/>
-        </p:nvCxnSpPr>
-        <p:spPr>
-          <a:xfrm>
-            <a:off x="3156748" y="2818664"/>
-            <a:ext cx="0" cy="588529"/>
           </a:xfrm>
           <a:prstGeom prst="straightConnector1">
             <a:avLst/>
@@ -4292,7 +3970,7 @@
         <p:spPr>
           <a:xfrm>
             <a:off x="2157578" y="2074198"/>
-            <a:ext cx="0" cy="4542359"/>
+            <a:ext cx="0" cy="4288502"/>
           </a:xfrm>
           <a:prstGeom prst="line">
             <a:avLst/>
@@ -4418,19 +4096,17 @@
           <p:cNvPr id="192" name="Elbow Connector 191"/>
           <p:cNvCxnSpPr>
             <a:stCxn id="36" idx="3"/>
-            <a:endCxn id="18" idx="1"/>
+            <a:endCxn id="18" idx="2"/>
           </p:cNvCxnSpPr>
           <p:nvPr/>
         </p:nvCxnSpPr>
         <p:spPr>
           <a:xfrm flipV="1">
-            <a:off x="6048600" y="3737212"/>
-            <a:ext cx="793689" cy="2059170"/>
-          </a:xfrm>
-          <a:prstGeom prst="bentConnector3">
-            <a:avLst>
-              <a:gd name="adj1" fmla="val 50000"/>
-            </a:avLst>
+            <a:off x="6048602" y="4069952"/>
+            <a:ext cx="1460437" cy="838463"/>
+          </a:xfrm>
+          <a:prstGeom prst="bentConnector2">
+            <a:avLst/>
           </a:prstGeom>
           <a:ln w="25400">
             <a:solidFill>
@@ -4466,12 +4142,12 @@
         </p:nvCxnSpPr>
         <p:spPr>
           <a:xfrm rot="10800000">
-            <a:off x="3704002" y="4908414"/>
-            <a:ext cx="1011098" cy="887968"/>
+            <a:off x="3704002" y="4908415"/>
+            <a:ext cx="1011100" cy="1"/>
           </a:xfrm>
           <a:prstGeom prst="bentConnector3">
             <a:avLst>
-              <a:gd name="adj1" fmla="val 22286"/>
+              <a:gd name="adj1" fmla="val 50000"/>
             </a:avLst>
           </a:prstGeom>
           <a:ln w="25400">
@@ -4499,39 +4175,37 @@
       </p:cxnSp>
       <p:cxnSp>
         <p:nvCxnSpPr>
-          <p:cNvPr id="234" name="Elbow Connector 233"/>
+          <p:cNvPr id="43" name="Straight Arrow Connector 42"/>
           <p:cNvCxnSpPr>
-            <a:stCxn id="4" idx="2"/>
-            <a:endCxn id="15" idx="0"/>
+            <a:stCxn id="36" idx="0"/>
+            <a:endCxn id="17" idx="2"/>
           </p:cNvCxnSpPr>
           <p:nvPr/>
         </p:nvCxnSpPr>
         <p:spPr>
-          <a:xfrm rot="5400000">
-            <a:off x="3728860" y="1754202"/>
-            <a:ext cx="1080880" cy="2225103"/>
-          </a:xfrm>
-          <a:prstGeom prst="bentConnector3">
-            <a:avLst>
-              <a:gd name="adj1" fmla="val 60916"/>
-            </a:avLst>
+          <a:xfrm flipH="1" flipV="1">
+            <a:off x="5381851" y="4044175"/>
+            <a:ext cx="1" cy="531500"/>
+          </a:xfrm>
+          <a:prstGeom prst="straightConnector1">
+            <a:avLst/>
           </a:prstGeom>
-          <a:ln w="25400">
+          <a:ln>
             <a:solidFill>
               <a:schemeClr val="tx1"/>
             </a:solidFill>
-            <a:headEnd type="arrow"/>
             <a:tailEnd type="arrow"/>
           </a:ln>
+          <a:effectLst/>
         </p:spPr>
         <p:style>
-          <a:lnRef idx="1">
+          <a:lnRef idx="2">
             <a:schemeClr val="accent1"/>
           </a:lnRef>
           <a:fillRef idx="0">
             <a:schemeClr val="accent1"/>
           </a:fillRef>
-          <a:effectRef idx="0">
+          <a:effectRef idx="1">
             <a:schemeClr val="accent1"/>
           </a:effectRef>
           <a:fontRef idx="minor">
@@ -4541,39 +4215,221 @@
       </p:cxnSp>
       <p:cxnSp>
         <p:nvCxnSpPr>
-          <p:cNvPr id="236" name="Elbow Connector 235"/>
-          <p:cNvCxnSpPr>
-            <a:stCxn id="4" idx="2"/>
-            <a:endCxn id="18" idx="0"/>
-          </p:cNvCxnSpPr>
+          <p:cNvPr id="56" name="Straight Connector 55"/>
+          <p:cNvCxnSpPr/>
           <p:nvPr/>
         </p:nvCxnSpPr>
         <p:spPr>
-          <a:xfrm rot="16200000" flipH="1">
-            <a:off x="5906366" y="1801798"/>
-            <a:ext cx="1078159" cy="2127188"/>
-          </a:xfrm>
-          <a:prstGeom prst="bentConnector3">
-            <a:avLst>
-              <a:gd name="adj1" fmla="val 60943"/>
-            </a:avLst>
+          <a:xfrm>
+            <a:off x="3156748" y="2788920"/>
+            <a:ext cx="1770852" cy="0"/>
+          </a:xfrm>
+          <a:prstGeom prst="line">
+            <a:avLst/>
           </a:prstGeom>
           <a:ln w="25400">
             <a:solidFill>
               <a:schemeClr val="tx1"/>
             </a:solidFill>
-            <a:headEnd type="arrow"/>
+          </a:ln>
+          <a:effectLst/>
+        </p:spPr>
+        <p:style>
+          <a:lnRef idx="1">
+            <a:schemeClr val="accent1"/>
+          </a:lnRef>
+          <a:fillRef idx="0">
+            <a:schemeClr val="accent1"/>
+          </a:fillRef>
+          <a:effectRef idx="0">
+            <a:schemeClr val="accent1"/>
+          </a:effectRef>
+          <a:fontRef idx="minor">
+            <a:schemeClr val="tx1"/>
+          </a:fontRef>
+        </p:style>
+      </p:cxnSp>
+      <p:cxnSp>
+        <p:nvCxnSpPr>
+          <p:cNvPr id="57" name="Straight Connector 56"/>
+          <p:cNvCxnSpPr/>
+          <p:nvPr/>
+        </p:nvCxnSpPr>
+        <p:spPr>
+          <a:xfrm>
+            <a:off x="5829300" y="2797810"/>
+            <a:ext cx="1679739" cy="0"/>
+          </a:xfrm>
+          <a:prstGeom prst="line">
+            <a:avLst/>
+          </a:prstGeom>
+          <a:ln w="25400">
+            <a:solidFill>
+              <a:schemeClr val="tx1"/>
+            </a:solidFill>
+          </a:ln>
+          <a:effectLst/>
+        </p:spPr>
+        <p:style>
+          <a:lnRef idx="1">
+            <a:schemeClr val="accent1"/>
+          </a:lnRef>
+          <a:fillRef idx="0">
+            <a:schemeClr val="accent1"/>
+          </a:fillRef>
+          <a:effectRef idx="0">
+            <a:schemeClr val="accent1"/>
+          </a:effectRef>
+          <a:fontRef idx="minor">
+            <a:schemeClr val="tx1"/>
+          </a:fontRef>
+        </p:style>
+      </p:cxnSp>
+      <p:cxnSp>
+        <p:nvCxnSpPr>
+          <p:cNvPr id="60" name="Straight Arrow Connector 59"/>
+          <p:cNvCxnSpPr>
+            <a:endCxn id="15" idx="0"/>
+          </p:cNvCxnSpPr>
+          <p:nvPr/>
+        </p:nvCxnSpPr>
+        <p:spPr>
+          <a:xfrm>
+            <a:off x="3156748" y="2788920"/>
+            <a:ext cx="0" cy="618273"/>
+          </a:xfrm>
+          <a:prstGeom prst="straightConnector1">
+            <a:avLst/>
+          </a:prstGeom>
+          <a:ln>
+            <a:solidFill>
+              <a:schemeClr val="tx1"/>
+            </a:solidFill>
             <a:tailEnd type="arrow"/>
           </a:ln>
+          <a:effectLst/>
         </p:spPr>
         <p:style>
-          <a:lnRef idx="1">
+          <a:lnRef idx="2">
             <a:schemeClr val="accent1"/>
           </a:lnRef>
           <a:fillRef idx="0">
             <a:schemeClr val="accent1"/>
           </a:fillRef>
-          <a:effectRef idx="0">
+          <a:effectRef idx="1">
+            <a:schemeClr val="accent1"/>
+          </a:effectRef>
+          <a:fontRef idx="minor">
+            <a:schemeClr val="tx1"/>
+          </a:fontRef>
+        </p:style>
+      </p:cxnSp>
+      <p:cxnSp>
+        <p:nvCxnSpPr>
+          <p:cNvPr id="63" name="Straight Arrow Connector 62"/>
+          <p:cNvCxnSpPr>
+            <a:endCxn id="18" idx="0"/>
+          </p:cNvCxnSpPr>
+          <p:nvPr/>
+        </p:nvCxnSpPr>
+        <p:spPr>
+          <a:xfrm flipH="1">
+            <a:off x="7509039" y="2797810"/>
+            <a:ext cx="1" cy="606662"/>
+          </a:xfrm>
+          <a:prstGeom prst="straightConnector1">
+            <a:avLst/>
+          </a:prstGeom>
+          <a:ln>
+            <a:solidFill>
+              <a:schemeClr val="tx1"/>
+            </a:solidFill>
+            <a:tailEnd type="arrow"/>
+          </a:ln>
+          <a:effectLst/>
+        </p:spPr>
+        <p:style>
+          <a:lnRef idx="2">
+            <a:schemeClr val="accent1"/>
+          </a:lnRef>
+          <a:fillRef idx="0">
+            <a:schemeClr val="accent1"/>
+          </a:fillRef>
+          <a:effectRef idx="1">
+            <a:schemeClr val="accent1"/>
+          </a:effectRef>
+          <a:fontRef idx="minor">
+            <a:schemeClr val="tx1"/>
+          </a:fontRef>
+        </p:style>
+      </p:cxnSp>
+      <p:cxnSp>
+        <p:nvCxnSpPr>
+          <p:cNvPr id="66" name="Straight Arrow Connector 65"/>
+          <p:cNvCxnSpPr/>
+          <p:nvPr/>
+        </p:nvCxnSpPr>
+        <p:spPr>
+          <a:xfrm flipV="1">
+            <a:off x="5829300" y="2326313"/>
+            <a:ext cx="0" cy="462607"/>
+          </a:xfrm>
+          <a:prstGeom prst="straightConnector1">
+            <a:avLst/>
+          </a:prstGeom>
+          <a:ln>
+            <a:solidFill>
+              <a:schemeClr val="tx1"/>
+            </a:solidFill>
+            <a:tailEnd type="arrow"/>
+          </a:ln>
+          <a:effectLst/>
+        </p:spPr>
+        <p:style>
+          <a:lnRef idx="2">
+            <a:schemeClr val="accent1"/>
+          </a:lnRef>
+          <a:fillRef idx="0">
+            <a:schemeClr val="accent1"/>
+          </a:fillRef>
+          <a:effectRef idx="1">
+            <a:schemeClr val="accent1"/>
+          </a:effectRef>
+          <a:fontRef idx="minor">
+            <a:schemeClr val="tx1"/>
+          </a:fontRef>
+        </p:style>
+      </p:cxnSp>
+      <p:cxnSp>
+        <p:nvCxnSpPr>
+          <p:cNvPr id="69" name="Straight Arrow Connector 68"/>
+          <p:cNvCxnSpPr/>
+          <p:nvPr/>
+        </p:nvCxnSpPr>
+        <p:spPr>
+          <a:xfrm flipV="1">
+            <a:off x="4940300" y="2335203"/>
+            <a:ext cx="0" cy="462607"/>
+          </a:xfrm>
+          <a:prstGeom prst="straightConnector1">
+            <a:avLst/>
+          </a:prstGeom>
+          <a:ln>
+            <a:solidFill>
+              <a:schemeClr val="tx1"/>
+            </a:solidFill>
+            <a:tailEnd type="arrow"/>
+          </a:ln>
+          <a:effectLst/>
+        </p:spPr>
+        <p:style>
+          <a:lnRef idx="2">
+            <a:schemeClr val="accent1"/>
+          </a:lnRef>
+          <a:fillRef idx="0">
+            <a:schemeClr val="accent1"/>
+          </a:fillRef>
+          <a:effectRef idx="1">
             <a:schemeClr val="accent1"/>
           </a:effectRef>
           <a:fontRef idx="minor">
@@ -4594,7 +4450,7 @@
   <p:timing>
     <p:tnLst>
       <p:par>
-        <p:cTn id="1" dur="indefinite" restart="never" nodeType="tmRoot"/>
+        <p:cTn xmlns:p14="http://schemas.microsoft.com/office/powerpoint/2010/main" id="1" dur="indefinite" restart="never" nodeType="tmRoot"/>
       </p:par>
     </p:tnLst>
   </p:timing>

</xml_diff>